<commit_message>
Made changes to python notebook, document and presentation
Python Notebook: added GridSearchCV
Document: Changed Random Forest Analysis
Presentation: Trimmed
</commit_message>
<xml_diff>
--- a/Capstone Project/Original/Capstone_Presentation.pptx
+++ b/Capstone Project/Original/Capstone_Presentation.pptx
@@ -502,7 +502,7 @@
           <a:p>
             <a:fld id="{7F7543A3-65D6-4442-942E-8FC70883E7B7}" type="datetimeFigureOut">
               <a:rPr lang="en-CA" smtClean="0"/>
-              <a:t>28/08/2018</a:t>
+              <a:t>31/08/2018</a:t>
             </a:fld>
             <a:endParaRPr lang="en-CA"/>
           </a:p>
@@ -749,7 +749,7 @@
           <a:p>
             <a:fld id="{7F7543A3-65D6-4442-942E-8FC70883E7B7}" type="datetimeFigureOut">
               <a:rPr lang="en-CA" smtClean="0"/>
-              <a:t>28/08/2018</a:t>
+              <a:t>31/08/2018</a:t>
             </a:fld>
             <a:endParaRPr lang="en-CA"/>
           </a:p>
@@ -1135,7 +1135,7 @@
           <a:p>
             <a:fld id="{7F7543A3-65D6-4442-942E-8FC70883E7B7}" type="datetimeFigureOut">
               <a:rPr lang="en-CA" smtClean="0"/>
-              <a:t>28/08/2018</a:t>
+              <a:t>31/08/2018</a:t>
             </a:fld>
             <a:endParaRPr lang="en-CA"/>
           </a:p>
@@ -1364,7 +1364,7 @@
           <a:p>
             <a:fld id="{7F7543A3-65D6-4442-942E-8FC70883E7B7}" type="datetimeFigureOut">
               <a:rPr lang="en-CA" smtClean="0"/>
-              <a:t>28/08/2018</a:t>
+              <a:t>31/08/2018</a:t>
             </a:fld>
             <a:endParaRPr lang="en-CA"/>
           </a:p>
@@ -1855,7 +1855,7 @@
           <a:p>
             <a:fld id="{7F7543A3-65D6-4442-942E-8FC70883E7B7}" type="datetimeFigureOut">
               <a:rPr lang="en-CA" smtClean="0"/>
-              <a:t>28/08/2018</a:t>
+              <a:t>31/08/2018</a:t>
             </a:fld>
             <a:endParaRPr lang="en-CA"/>
           </a:p>
@@ -2165,7 +2165,7 @@
           <a:p>
             <a:fld id="{7F7543A3-65D6-4442-942E-8FC70883E7B7}" type="datetimeFigureOut">
               <a:rPr lang="en-CA" smtClean="0"/>
-              <a:t>28/08/2018</a:t>
+              <a:t>31/08/2018</a:t>
             </a:fld>
             <a:endParaRPr lang="en-CA"/>
           </a:p>
@@ -2556,7 +2556,7 @@
           <a:p>
             <a:fld id="{7F7543A3-65D6-4442-942E-8FC70883E7B7}" type="datetimeFigureOut">
               <a:rPr lang="en-CA" smtClean="0"/>
-              <a:t>28/08/2018</a:t>
+              <a:t>31/08/2018</a:t>
             </a:fld>
             <a:endParaRPr lang="en-CA"/>
           </a:p>
@@ -2674,7 +2674,7 @@
           <a:p>
             <a:fld id="{7F7543A3-65D6-4442-942E-8FC70883E7B7}" type="datetimeFigureOut">
               <a:rPr lang="en-CA" smtClean="0"/>
-              <a:t>28/08/2018</a:t>
+              <a:t>31/08/2018</a:t>
             </a:fld>
             <a:endParaRPr lang="en-CA"/>
           </a:p>
@@ -2769,7 +2769,7 @@
           <a:p>
             <a:fld id="{7F7543A3-65D6-4442-942E-8FC70883E7B7}" type="datetimeFigureOut">
               <a:rPr lang="en-CA" smtClean="0"/>
-              <a:t>28/08/2018</a:t>
+              <a:t>31/08/2018</a:t>
             </a:fld>
             <a:endParaRPr lang="en-CA"/>
           </a:p>
@@ -3069,7 +3069,7 @@
           <a:p>
             <a:fld id="{7F7543A3-65D6-4442-942E-8FC70883E7B7}" type="datetimeFigureOut">
               <a:rPr lang="en-CA" smtClean="0"/>
-              <a:t>28/08/2018</a:t>
+              <a:t>31/08/2018</a:t>
             </a:fld>
             <a:endParaRPr lang="en-CA"/>
           </a:p>
@@ -3334,7 +3334,7 @@
           <a:p>
             <a:fld id="{7F7543A3-65D6-4442-942E-8FC70883E7B7}" type="datetimeFigureOut">
               <a:rPr lang="en-CA" smtClean="0"/>
-              <a:t>28/08/2018</a:t>
+              <a:t>31/08/2018</a:t>
             </a:fld>
             <a:endParaRPr lang="en-CA"/>
           </a:p>
@@ -3752,7 +3752,7 @@
           <a:p>
             <a:fld id="{7F7543A3-65D6-4442-942E-8FC70883E7B7}" type="datetimeFigureOut">
               <a:rPr lang="en-CA" smtClean="0"/>
-              <a:t>28/08/2018</a:t>
+              <a:t>31/08/2018</a:t>
             </a:fld>
             <a:endParaRPr lang="en-CA"/>
           </a:p>
@@ -5681,55 +5681,6 @@
       </p:grpSpPr>
       <p:sp>
         <p:nvSpPr>
-          <p:cNvPr id="2" name="TextBox 1">
-            <a:extLst>
-              <a:ext uri="{FF2B5EF4-FFF2-40B4-BE49-F238E27FC236}">
-                <a16:creationId xmlns:a16="http://schemas.microsoft.com/office/drawing/2014/main" id="{22AF205A-8FEB-41BE-81C5-DDA047AEBE02}"/>
-              </a:ext>
-            </a:extLst>
-          </p:cNvPr>
-          <p:cNvSpPr txBox="1"/>
-          <p:nvPr/>
-        </p:nvSpPr>
-        <p:spPr>
-          <a:xfrm>
-            <a:off x="257151" y="384313"/>
-            <a:ext cx="11677697" cy="923330"/>
-          </a:xfrm>
-          <a:prstGeom prst="rect">
-            <a:avLst/>
-          </a:prstGeom>
-          <a:noFill/>
-        </p:spPr>
-        <p:txBody>
-          <a:bodyPr wrap="square" rtlCol="0">
-            <a:spAutoFit/>
-          </a:bodyPr>
-          <a:lstStyle/>
-          <a:p>
-            <a:pPr marL="285750" indent="-285750">
-              <a:buFont typeface="Arial" panose="020B0604020202020204" pitchFamily="34" charset="0"/>
-              <a:buChar char="•"/>
-            </a:pPr>
-            <a:r>
-              <a:rPr lang="en-CA" dirty="0"/>
-              <a:t>In this section, we tested the null hypothesis that the mean of  two different sample populations were the same. </a:t>
-            </a:r>
-          </a:p>
-          <a:p>
-            <a:pPr marL="285750" indent="-285750">
-              <a:buFont typeface="Arial" panose="020B0604020202020204" pitchFamily="34" charset="0"/>
-              <a:buChar char="•"/>
-            </a:pPr>
-            <a:r>
-              <a:rPr lang="en-CA" dirty="0"/>
-              <a:t>We did this to identify whether certain variables add value to our analysis and draw conclusions about their respective means. Below are some examples:</a:t>
-            </a:r>
-          </a:p>
-        </p:txBody>
-      </p:sp>
-      <p:sp>
-        <p:nvSpPr>
           <p:cNvPr id="3" name="TextBox 2">
             <a:extLst>
               <a:ext uri="{FF2B5EF4-FFF2-40B4-BE49-F238E27FC236}">
@@ -5742,8 +5693,8 @@
         </p:nvSpPr>
         <p:spPr>
           <a:xfrm>
-            <a:off x="257150" y="1928189"/>
-            <a:ext cx="11677697" cy="1200329"/>
+            <a:off x="257150" y="894519"/>
+            <a:ext cx="11677697" cy="923330"/>
           </a:xfrm>
           <a:prstGeom prst="rect">
             <a:avLst/>
@@ -5755,16 +5706,6 @@
             <a:spAutoFit/>
           </a:bodyPr>
           <a:lstStyle/>
-          <a:p>
-            <a:pPr marL="285750" indent="-285750">
-              <a:buFont typeface="Arial" panose="020B0604020202020204" pitchFamily="34" charset="0"/>
-              <a:buChar char="•"/>
-            </a:pPr>
-            <a:r>
-              <a:rPr lang="en-CA" dirty="0"/>
-              <a:t>Firstly, we separated the dataset into two sample groups, those with high and low blood pressures.</a:t>
-            </a:r>
-          </a:p>
           <a:p>
             <a:pPr marL="285750" indent="-285750">
               <a:buFont typeface="Arial" panose="020B0604020202020204" pitchFamily="34" charset="0"/>
@@ -5802,14 +5743,14 @@
           <p:nvPr>
             <p:extLst>
               <p:ext uri="{D42A27DB-BD31-4B8C-83A1-F6EECF244321}">
-                <p14:modId xmlns:p14="http://schemas.microsoft.com/office/powerpoint/2010/main" val="1107806971"/>
+                <p14:modId xmlns:p14="http://schemas.microsoft.com/office/powerpoint/2010/main" val="3861583962"/>
               </p:ext>
             </p:extLst>
           </p:nvPr>
         </p:nvGraphicFramePr>
         <p:xfrm>
-          <a:off x="3127373" y="3266890"/>
-          <a:ext cx="5937250" cy="436372"/>
+          <a:off x="2849217" y="1930691"/>
+          <a:ext cx="6215406" cy="748030"/>
         </p:xfrm>
         <a:graphic>
           <a:graphicData uri="http://schemas.openxmlformats.org/drawingml/2006/table">
@@ -5818,14 +5759,14 @@
                 <a:tableStyleId>{5C22544A-7EE6-4342-B048-85BDC9FD1C3A}</a:tableStyleId>
               </a:tblPr>
               <a:tblGrid>
-                <a:gridCol w="2968625">
+                <a:gridCol w="3107703">
                   <a:extLst>
                     <a:ext uri="{9D8B030D-6E8A-4147-A177-3AD203B41FA5}">
                       <a16:colId xmlns:a16="http://schemas.microsoft.com/office/drawing/2014/main" val="2156786689"/>
                     </a:ext>
                   </a:extLst>
                 </a:gridCol>
-                <a:gridCol w="2968625">
+                <a:gridCol w="3107703">
                   <a:extLst>
                     <a:ext uri="{9D8B030D-6E8A-4147-A177-3AD203B41FA5}">
                       <a16:colId xmlns:a16="http://schemas.microsoft.com/office/drawing/2014/main" val="2299949392"/>
@@ -5833,7 +5774,7 @@
                   </a:extLst>
                 </a:gridCol>
               </a:tblGrid>
-              <a:tr h="0">
+              <a:tr h="369451">
                 <a:tc>
                   <a:txBody>
                     <a:bodyPr/>
@@ -5848,12 +5789,12 @@
                         </a:spcAft>
                       </a:pPr>
                       <a:r>
-                        <a:rPr lang="en-CA" sz="1400">
+                        <a:rPr lang="en-CA" sz="2400" dirty="0">
                           <a:effectLst/>
                         </a:rPr>
                         <a:t>test statistic</a:t>
                       </a:r>
-                      <a:endParaRPr lang="en-CA" sz="1200">
+                      <a:endParaRPr lang="en-CA" sz="2000" dirty="0">
                         <a:effectLst/>
                         <a:latin typeface="Calibri" panose="020F0502020204030204" pitchFamily="34" charset="0"/>
                         <a:ea typeface="Calibri" panose="020F0502020204030204" pitchFamily="34" charset="0"/>
@@ -5877,12 +5818,12 @@
                         </a:spcAft>
                       </a:pPr>
                       <a:r>
-                        <a:rPr lang="en-CA" sz="1400">
+                        <a:rPr lang="en-CA" sz="2400">
                           <a:effectLst/>
                         </a:rPr>
                         <a:t>p-value</a:t>
                       </a:r>
-                      <a:endParaRPr lang="en-CA" sz="1200">
+                      <a:endParaRPr lang="en-CA" sz="2000">
                         <a:effectLst/>
                         <a:latin typeface="Calibri" panose="020F0502020204030204" pitchFamily="34" charset="0"/>
                         <a:ea typeface="Calibri" panose="020F0502020204030204" pitchFamily="34" charset="0"/>
@@ -5898,7 +5839,7 @@
                   </a:ext>
                 </a:extLst>
               </a:tr>
-              <a:tr h="0">
+              <a:tr h="369451">
                 <a:tc>
                   <a:txBody>
                     <a:bodyPr/>
@@ -5913,12 +5854,12 @@
                         </a:spcAft>
                       </a:pPr>
                       <a:r>
-                        <a:rPr lang="en-CA" sz="1400" dirty="0">
+                        <a:rPr lang="en-CA" sz="2400" dirty="0">
                           <a:effectLst/>
                         </a:rPr>
                         <a:t>3.43</a:t>
                       </a:r>
-                      <a:endParaRPr lang="en-CA" sz="1200" dirty="0">
+                      <a:endParaRPr lang="en-CA" sz="2000" dirty="0">
                         <a:effectLst/>
                         <a:latin typeface="Calibri" panose="020F0502020204030204" pitchFamily="34" charset="0"/>
                         <a:ea typeface="Calibri" panose="020F0502020204030204" pitchFamily="34" charset="0"/>
@@ -5942,12 +5883,12 @@
                         </a:spcAft>
                       </a:pPr>
                       <a:r>
-                        <a:rPr lang="en-CA" sz="1400" dirty="0">
+                        <a:rPr lang="en-CA" sz="2400" dirty="0">
                           <a:effectLst/>
                         </a:rPr>
                         <a:t>0.0006</a:t>
                       </a:r>
-                      <a:endParaRPr lang="en-CA" sz="1200" dirty="0">
+                      <a:endParaRPr lang="en-CA" sz="2000" dirty="0">
                         <a:effectLst/>
                         <a:latin typeface="Calibri" panose="020F0502020204030204" pitchFamily="34" charset="0"/>
                         <a:ea typeface="Calibri" panose="020F0502020204030204" pitchFamily="34" charset="0"/>
@@ -5981,7 +5922,7 @@
         </p:nvSpPr>
         <p:spPr>
           <a:xfrm>
-            <a:off x="257150" y="1446015"/>
+            <a:off x="257150" y="412345"/>
             <a:ext cx="5935279" cy="369332"/>
           </a:xfrm>
           <a:prstGeom prst="rect">
@@ -6016,8 +5957,8 @@
         </p:nvSpPr>
         <p:spPr>
           <a:xfrm>
-            <a:off x="257150" y="4439476"/>
-            <a:ext cx="11677697" cy="1200329"/>
+            <a:off x="257150" y="3405806"/>
+            <a:ext cx="11677697" cy="923330"/>
           </a:xfrm>
           <a:prstGeom prst="rect">
             <a:avLst/>
@@ -6029,16 +5970,6 @@
             <a:spAutoFit/>
           </a:bodyPr>
           <a:lstStyle/>
-          <a:p>
-            <a:pPr marL="285750" indent="-285750">
-              <a:buFont typeface="Arial" panose="020B0604020202020204" pitchFamily="34" charset="0"/>
-              <a:buChar char="•"/>
-            </a:pPr>
-            <a:r>
-              <a:rPr lang="en-CA" dirty="0"/>
-              <a:t>Firstly, we separated the dataset into two sample groups, those with normal and abnormal RER readings</a:t>
-            </a:r>
-          </a:p>
           <a:p>
             <a:pPr marL="285750" indent="-285750">
               <a:buFont typeface="Arial" panose="020B0604020202020204" pitchFamily="34" charset="0"/>
@@ -6075,7 +6006,7 @@
         </p:nvSpPr>
         <p:spPr>
           <a:xfrm>
-            <a:off x="257150" y="3957302"/>
+            <a:off x="257150" y="2923632"/>
             <a:ext cx="5811334" cy="369332"/>
           </a:xfrm>
           <a:prstGeom prst="rect">
@@ -6111,14 +6042,14 @@
           <p:nvPr>
             <p:extLst>
               <p:ext uri="{D42A27DB-BD31-4B8C-83A1-F6EECF244321}">
-                <p14:modId xmlns:p14="http://schemas.microsoft.com/office/powerpoint/2010/main" val="1625783874"/>
+                <p14:modId xmlns:p14="http://schemas.microsoft.com/office/powerpoint/2010/main" val="2102261678"/>
               </p:ext>
             </p:extLst>
           </p:nvPr>
         </p:nvGraphicFramePr>
         <p:xfrm>
-          <a:off x="3127373" y="5900528"/>
-          <a:ext cx="5937250" cy="436372"/>
+          <a:off x="2849217" y="4691558"/>
+          <a:ext cx="6215406" cy="748030"/>
         </p:xfrm>
         <a:graphic>
           <a:graphicData uri="http://schemas.openxmlformats.org/drawingml/2006/table">
@@ -6127,14 +6058,14 @@
                 <a:tableStyleId>{5C22544A-7EE6-4342-B048-85BDC9FD1C3A}</a:tableStyleId>
               </a:tblPr>
               <a:tblGrid>
-                <a:gridCol w="2968625">
+                <a:gridCol w="3107703">
                   <a:extLst>
                     <a:ext uri="{9D8B030D-6E8A-4147-A177-3AD203B41FA5}">
                       <a16:colId xmlns:a16="http://schemas.microsoft.com/office/drawing/2014/main" val="2546246376"/>
                     </a:ext>
                   </a:extLst>
                 </a:gridCol>
-                <a:gridCol w="2968625">
+                <a:gridCol w="3107703">
                   <a:extLst>
                     <a:ext uri="{9D8B030D-6E8A-4147-A177-3AD203B41FA5}">
                       <a16:colId xmlns:a16="http://schemas.microsoft.com/office/drawing/2014/main" val="2943223732"/>
@@ -6157,12 +6088,12 @@
                         </a:spcAft>
                       </a:pPr>
                       <a:r>
-                        <a:rPr lang="en-CA" sz="1400">
+                        <a:rPr lang="en-CA" sz="2400">
                           <a:effectLst/>
                         </a:rPr>
                         <a:t>test statistic</a:t>
                       </a:r>
-                      <a:endParaRPr lang="en-CA" sz="1200">
+                      <a:endParaRPr lang="en-CA" sz="2000">
                         <a:effectLst/>
                         <a:latin typeface="Calibri" panose="020F0502020204030204" pitchFamily="34" charset="0"/>
                         <a:ea typeface="Calibri" panose="020F0502020204030204" pitchFamily="34" charset="0"/>
@@ -6186,12 +6117,12 @@
                         </a:spcAft>
                       </a:pPr>
                       <a:r>
-                        <a:rPr lang="en-CA" sz="1400">
+                        <a:rPr lang="en-CA" sz="2400">
                           <a:effectLst/>
                         </a:rPr>
                         <a:t>p-value</a:t>
                       </a:r>
-                      <a:endParaRPr lang="en-CA" sz="1200">
+                      <a:endParaRPr lang="en-CA" sz="2000">
                         <a:effectLst/>
                         <a:latin typeface="Calibri" panose="020F0502020204030204" pitchFamily="34" charset="0"/>
                         <a:ea typeface="Calibri" panose="020F0502020204030204" pitchFamily="34" charset="0"/>
@@ -6222,12 +6153,12 @@
                         </a:spcAft>
                       </a:pPr>
                       <a:r>
-                        <a:rPr lang="en-CA" sz="1400">
+                        <a:rPr lang="en-CA" sz="2400" dirty="0">
                           <a:effectLst/>
                         </a:rPr>
                         <a:t>-2.98</a:t>
                       </a:r>
-                      <a:endParaRPr lang="en-CA" sz="1200">
+                      <a:endParaRPr lang="en-CA" sz="2000" dirty="0">
                         <a:effectLst/>
                         <a:latin typeface="Calibri" panose="020F0502020204030204" pitchFamily="34" charset="0"/>
                         <a:ea typeface="Calibri" panose="020F0502020204030204" pitchFamily="34" charset="0"/>
@@ -6251,12 +6182,12 @@
                         </a:spcAft>
                       </a:pPr>
                       <a:r>
-                        <a:rPr lang="en-CA" sz="1400" dirty="0">
+                        <a:rPr lang="en-CA" sz="2400" dirty="0">
                           <a:effectLst/>
                         </a:rPr>
                         <a:t>0.002</a:t>
                       </a:r>
-                      <a:endParaRPr lang="en-CA" sz="1200" dirty="0">
+                      <a:endParaRPr lang="en-CA" sz="2000" dirty="0">
                         <a:effectLst/>
                         <a:latin typeface="Calibri" panose="020F0502020204030204" pitchFamily="34" charset="0"/>
                         <a:ea typeface="Calibri" panose="020F0502020204030204" pitchFamily="34" charset="0"/>
@@ -6421,41 +6352,6 @@
           </a:p>
         </p:txBody>
       </p:sp>
-      <p:sp>
-        <p:nvSpPr>
-          <p:cNvPr id="3" name="TextBox 2">
-            <a:extLst>
-              <a:ext uri="{FF2B5EF4-FFF2-40B4-BE49-F238E27FC236}">
-                <a16:creationId xmlns:a16="http://schemas.microsoft.com/office/drawing/2014/main" id="{6945E670-0AE6-4933-A9DF-9A6AB2AD7234}"/>
-              </a:ext>
-            </a:extLst>
-          </p:cNvPr>
-          <p:cNvSpPr txBox="1"/>
-          <p:nvPr/>
-        </p:nvSpPr>
-        <p:spPr>
-          <a:xfrm>
-            <a:off x="503583" y="993913"/>
-            <a:ext cx="11706603" cy="369332"/>
-          </a:xfrm>
-          <a:prstGeom prst="rect">
-            <a:avLst/>
-          </a:prstGeom>
-          <a:noFill/>
-        </p:spPr>
-        <p:txBody>
-          <a:bodyPr wrap="none" rtlCol="0">
-            <a:spAutoFit/>
-          </a:bodyPr>
-          <a:lstStyle/>
-          <a:p>
-            <a:r>
-              <a:rPr lang="en-CA" dirty="0"/>
-              <a:t>We began our analysis by using a logistic regression model to predict our results. Below are the coefficients of our analysis:</a:t>
-            </a:r>
-          </a:p>
-        </p:txBody>
-      </p:sp>
       <p:graphicFrame>
         <p:nvGraphicFramePr>
           <p:cNvPr id="6" name="Table 5">
@@ -6471,7 +6367,7 @@
           <p:nvPr>
             <p:extLst>
               <p:ext uri="{D42A27DB-BD31-4B8C-83A1-F6EECF244321}">
-                <p14:modId xmlns:p14="http://schemas.microsoft.com/office/powerpoint/2010/main" val="2655316129"/>
+                <p14:modId xmlns:p14="http://schemas.microsoft.com/office/powerpoint/2010/main" val="169913342"/>
               </p:ext>
             </p:extLst>
           </p:nvPr>
@@ -6777,12 +6673,18 @@
                         </a:spcAft>
                       </a:pPr>
                       <a:r>
-                        <a:rPr lang="en-CA" sz="1400" dirty="0">
+                        <a:rPr lang="en-CA" sz="1400" b="1" dirty="0">
+                          <a:solidFill>
+                            <a:schemeClr val="tx1"/>
+                          </a:solidFill>
                           <a:effectLst/>
                         </a:rPr>
                         <a:t>Sex</a:t>
                       </a:r>
-                      <a:endParaRPr lang="en-CA" sz="1200" dirty="0">
+                      <a:endParaRPr lang="en-CA" sz="1200" b="1" dirty="0">
+                        <a:solidFill>
+                          <a:schemeClr val="tx1"/>
+                        </a:solidFill>
                         <a:effectLst/>
                         <a:latin typeface="Calibri" panose="020F0502020204030204" pitchFamily="34" charset="0"/>
                         <a:ea typeface="Calibri" panose="020F0502020204030204" pitchFamily="34" charset="0"/>
@@ -6806,12 +6708,18 @@
                         </a:spcAft>
                       </a:pPr>
                       <a:r>
-                        <a:rPr lang="en-CA" sz="1400">
+                        <a:rPr lang="en-CA" sz="1400" b="1" dirty="0">
+                          <a:solidFill>
+                            <a:schemeClr val="tx1"/>
+                          </a:solidFill>
                           <a:effectLst/>
                         </a:rPr>
                         <a:t>1.108</a:t>
                       </a:r>
-                      <a:endParaRPr lang="en-CA" sz="1200">
+                      <a:endParaRPr lang="en-CA" sz="1200" b="1" dirty="0">
+                        <a:solidFill>
+                          <a:schemeClr val="tx1"/>
+                        </a:solidFill>
                         <a:effectLst/>
                         <a:latin typeface="Calibri" panose="020F0502020204030204" pitchFamily="34" charset="0"/>
                         <a:ea typeface="Calibri" panose="020F0502020204030204" pitchFamily="34" charset="0"/>
@@ -6835,12 +6743,18 @@
                         </a:spcAft>
                       </a:pPr>
                       <a:r>
-                        <a:rPr lang="en-CA" sz="1400">
+                        <a:rPr lang="en-CA" sz="1400" b="1" dirty="0">
+                          <a:solidFill>
+                            <a:schemeClr val="tx1"/>
+                          </a:solidFill>
                           <a:effectLst/>
                         </a:rPr>
                         <a:t>0.425</a:t>
                       </a:r>
-                      <a:endParaRPr lang="en-CA" sz="1200">
+                      <a:endParaRPr lang="en-CA" sz="1200" b="1" dirty="0">
+                        <a:solidFill>
+                          <a:schemeClr val="tx1"/>
+                        </a:solidFill>
                         <a:effectLst/>
                         <a:latin typeface="Calibri" panose="020F0502020204030204" pitchFamily="34" charset="0"/>
                         <a:ea typeface="Calibri" panose="020F0502020204030204" pitchFamily="34" charset="0"/>
@@ -6864,12 +6778,18 @@
                         </a:spcAft>
                       </a:pPr>
                       <a:r>
-                        <a:rPr lang="en-CA" sz="1400">
+                        <a:rPr lang="en-CA" sz="1400" b="1" dirty="0">
+                          <a:solidFill>
+                            <a:schemeClr val="tx1"/>
+                          </a:solidFill>
                           <a:effectLst/>
                         </a:rPr>
                         <a:t>3.023</a:t>
                       </a:r>
-                      <a:endParaRPr lang="en-CA" sz="1200">
+                      <a:endParaRPr lang="en-CA" sz="1200" b="1" dirty="0">
+                        <a:solidFill>
+                          <a:schemeClr val="tx1"/>
+                        </a:solidFill>
                         <a:effectLst/>
                         <a:latin typeface="Calibri" panose="020F0502020204030204" pitchFamily="34" charset="0"/>
                         <a:ea typeface="Calibri" panose="020F0502020204030204" pitchFamily="34" charset="0"/>
@@ -6900,12 +6820,18 @@
                         </a:spcAft>
                       </a:pPr>
                       <a:r>
-                        <a:rPr lang="en-CA" sz="1400">
+                        <a:rPr lang="en-CA" sz="1400" dirty="0">
+                          <a:solidFill>
+                            <a:schemeClr val="tx1"/>
+                          </a:solidFill>
                           <a:effectLst/>
                         </a:rPr>
                         <a:t>Chest Pain</a:t>
                       </a:r>
-                      <a:endParaRPr lang="en-CA" sz="1200">
+                      <a:endParaRPr lang="en-CA" sz="1200" dirty="0">
+                        <a:solidFill>
+                          <a:schemeClr val="tx1"/>
+                        </a:solidFill>
                         <a:effectLst/>
                         <a:latin typeface="Calibri" panose="020F0502020204030204" pitchFamily="34" charset="0"/>
                         <a:ea typeface="Calibri" panose="020F0502020204030204" pitchFamily="34" charset="0"/>
@@ -6929,12 +6855,18 @@
                         </a:spcAft>
                       </a:pPr>
                       <a:r>
-                        <a:rPr lang="en-CA" sz="1400">
+                        <a:rPr lang="en-CA" sz="1400" dirty="0">
+                          <a:solidFill>
+                            <a:schemeClr val="tx1"/>
+                          </a:solidFill>
                           <a:effectLst/>
                         </a:rPr>
                         <a:t>0.542</a:t>
                       </a:r>
-                      <a:endParaRPr lang="en-CA" sz="1200">
+                      <a:endParaRPr lang="en-CA" sz="1200" dirty="0">
+                        <a:solidFill>
+                          <a:schemeClr val="tx1"/>
+                        </a:solidFill>
                         <a:effectLst/>
                         <a:latin typeface="Calibri" panose="020F0502020204030204" pitchFamily="34" charset="0"/>
                         <a:ea typeface="Calibri" panose="020F0502020204030204" pitchFamily="34" charset="0"/>
@@ -6958,12 +6890,18 @@
                         </a:spcAft>
                       </a:pPr>
                       <a:r>
-                        <a:rPr lang="en-CA" sz="1400">
+                        <a:rPr lang="en-CA" sz="1400" dirty="0">
+                          <a:solidFill>
+                            <a:schemeClr val="tx1"/>
+                          </a:solidFill>
                           <a:effectLst/>
                         </a:rPr>
                         <a:t>0.935</a:t>
                       </a:r>
-                      <a:endParaRPr lang="en-CA" sz="1200">
+                      <a:endParaRPr lang="en-CA" sz="1200" dirty="0">
+                        <a:solidFill>
+                          <a:schemeClr val="tx1"/>
+                        </a:solidFill>
                         <a:effectLst/>
                         <a:latin typeface="Calibri" panose="020F0502020204030204" pitchFamily="34" charset="0"/>
                         <a:ea typeface="Calibri" panose="020F0502020204030204" pitchFamily="34" charset="0"/>
@@ -6987,12 +6925,18 @@
                         </a:spcAft>
                       </a:pPr>
                       <a:r>
-                        <a:rPr lang="en-CA" sz="1400">
+                        <a:rPr lang="en-CA" sz="1400" dirty="0">
+                          <a:solidFill>
+                            <a:schemeClr val="tx1"/>
+                          </a:solidFill>
                           <a:effectLst/>
                         </a:rPr>
                         <a:t>1.720</a:t>
                       </a:r>
-                      <a:endParaRPr lang="en-CA" sz="1200">
+                      <a:endParaRPr lang="en-CA" sz="1200" dirty="0">
+                        <a:solidFill>
+                          <a:schemeClr val="tx1"/>
+                        </a:solidFill>
                         <a:effectLst/>
                         <a:latin typeface="Calibri" panose="020F0502020204030204" pitchFamily="34" charset="0"/>
                         <a:ea typeface="Calibri" panose="020F0502020204030204" pitchFamily="34" charset="0"/>
@@ -7081,12 +7025,12 @@
                         </a:spcAft>
                       </a:pPr>
                       <a:r>
-                        <a:rPr lang="en-CA" sz="1400">
+                        <a:rPr lang="en-CA" sz="1400" dirty="0">
                           <a:effectLst/>
                         </a:rPr>
                         <a:t>18.597</a:t>
                       </a:r>
-                      <a:endParaRPr lang="en-CA" sz="1200">
+                      <a:endParaRPr lang="en-CA" sz="1200" dirty="0">
                         <a:effectLst/>
                         <a:latin typeface="Calibri" panose="020F0502020204030204" pitchFamily="34" charset="0"/>
                         <a:ea typeface="Calibri" panose="020F0502020204030204" pitchFamily="34" charset="0"/>
@@ -7269,12 +7213,18 @@
                         </a:spcAft>
                       </a:pPr>
                       <a:r>
-                        <a:rPr lang="en-CA" sz="1400">
+                        <a:rPr lang="en-CA" sz="1400" b="1" dirty="0">
+                          <a:solidFill>
+                            <a:schemeClr val="tx1"/>
+                          </a:solidFill>
                           <a:effectLst/>
                         </a:rPr>
                         <a:t>Fasting Blood Sugar</a:t>
                       </a:r>
-                      <a:endParaRPr lang="en-CA" sz="1200">
+                      <a:endParaRPr lang="en-CA" sz="1200" b="1" dirty="0">
+                        <a:solidFill>
+                          <a:schemeClr val="tx1"/>
+                        </a:solidFill>
                         <a:effectLst/>
                         <a:latin typeface="Calibri" panose="020F0502020204030204" pitchFamily="34" charset="0"/>
                         <a:ea typeface="Calibri" panose="020F0502020204030204" pitchFamily="34" charset="0"/>
@@ -7298,12 +7248,18 @@
                         </a:spcAft>
                       </a:pPr>
                       <a:r>
-                        <a:rPr lang="en-CA" sz="1400">
+                        <a:rPr lang="en-CA" sz="1400" b="1" dirty="0">
+                          <a:solidFill>
+                            <a:schemeClr val="tx1"/>
+                          </a:solidFill>
                           <a:effectLst/>
                         </a:rPr>
                         <a:t>0.404</a:t>
                       </a:r>
-                      <a:endParaRPr lang="en-CA" sz="1200">
+                      <a:endParaRPr lang="en-CA" sz="1200" b="1" dirty="0">
+                        <a:solidFill>
+                          <a:schemeClr val="tx1"/>
+                        </a:solidFill>
                         <a:effectLst/>
                         <a:latin typeface="Calibri" panose="020F0502020204030204" pitchFamily="34" charset="0"/>
                         <a:ea typeface="Calibri" panose="020F0502020204030204" pitchFamily="34" charset="0"/>
@@ -7327,12 +7283,18 @@
                         </a:spcAft>
                       </a:pPr>
                       <a:r>
-                        <a:rPr lang="en-CA" sz="1400">
+                        <a:rPr lang="en-CA" sz="1400" b="1" dirty="0">
+                          <a:solidFill>
+                            <a:schemeClr val="tx1"/>
+                          </a:solidFill>
                           <a:effectLst/>
                         </a:rPr>
                         <a:t>0.356</a:t>
                       </a:r>
-                      <a:endParaRPr lang="en-CA" sz="1200">
+                      <a:endParaRPr lang="en-CA" sz="1200" b="1" dirty="0">
+                        <a:solidFill>
+                          <a:schemeClr val="tx1"/>
+                        </a:solidFill>
                         <a:effectLst/>
                         <a:latin typeface="Calibri" panose="020F0502020204030204" pitchFamily="34" charset="0"/>
                         <a:ea typeface="Calibri" panose="020F0502020204030204" pitchFamily="34" charset="0"/>
@@ -7356,12 +7318,18 @@
                         </a:spcAft>
                       </a:pPr>
                       <a:r>
-                        <a:rPr lang="en-CA" sz="1400">
+                        <a:rPr lang="en-CA" sz="1400" b="1" dirty="0">
+                          <a:solidFill>
+                            <a:schemeClr val="tx1"/>
+                          </a:solidFill>
                           <a:effectLst/>
                         </a:rPr>
                         <a:t>1.499</a:t>
                       </a:r>
-                      <a:endParaRPr lang="en-CA" sz="1200">
+                      <a:endParaRPr lang="en-CA" sz="1200" b="1" dirty="0">
+                        <a:solidFill>
+                          <a:schemeClr val="tx1"/>
+                        </a:solidFill>
                         <a:effectLst/>
                         <a:latin typeface="Calibri" panose="020F0502020204030204" pitchFamily="34" charset="0"/>
                         <a:ea typeface="Calibri" panose="020F0502020204030204" pitchFamily="34" charset="0"/>
@@ -7392,12 +7360,18 @@
                         </a:spcAft>
                       </a:pPr>
                       <a:r>
-                        <a:rPr lang="en-CA" sz="1400">
+                        <a:rPr lang="en-CA" sz="1400" b="1" dirty="0">
+                          <a:solidFill>
+                            <a:schemeClr val="tx1"/>
+                          </a:solidFill>
                           <a:effectLst/>
                         </a:rPr>
                         <a:t>Resting Electrocardiographic Results</a:t>
                       </a:r>
-                      <a:endParaRPr lang="en-CA" sz="1200">
+                      <a:endParaRPr lang="en-CA" sz="1200" b="1" dirty="0">
+                        <a:solidFill>
+                          <a:schemeClr val="tx1"/>
+                        </a:solidFill>
                         <a:effectLst/>
                         <a:latin typeface="Calibri" panose="020F0502020204030204" pitchFamily="34" charset="0"/>
                         <a:ea typeface="Calibri" panose="020F0502020204030204" pitchFamily="34" charset="0"/>
@@ -7421,12 +7395,18 @@
                         </a:spcAft>
                       </a:pPr>
                       <a:r>
-                        <a:rPr lang="en-CA" sz="1400">
+                        <a:rPr lang="en-CA" sz="1400" b="1">
+                          <a:solidFill>
+                            <a:schemeClr val="tx1"/>
+                          </a:solidFill>
                           <a:effectLst/>
                         </a:rPr>
                         <a:t> </a:t>
                       </a:r>
-                      <a:endParaRPr lang="en-CA" sz="1200">
+                      <a:endParaRPr lang="en-CA" sz="1200" b="1">
+                        <a:solidFill>
+                          <a:schemeClr val="tx1"/>
+                        </a:solidFill>
                         <a:effectLst/>
                       </a:endParaRPr>
                     </a:p>
@@ -7440,12 +7420,18 @@
                         </a:spcAft>
                       </a:pPr>
                       <a:r>
-                        <a:rPr lang="en-CA" sz="1400">
+                        <a:rPr lang="en-CA" sz="1400" b="1">
+                          <a:solidFill>
+                            <a:schemeClr val="tx1"/>
+                          </a:solidFill>
                           <a:effectLst/>
                         </a:rPr>
                         <a:t>0.277</a:t>
                       </a:r>
-                      <a:endParaRPr lang="en-CA" sz="1200">
+                      <a:endParaRPr lang="en-CA" sz="1200" b="1">
+                        <a:solidFill>
+                          <a:schemeClr val="tx1"/>
+                        </a:solidFill>
                         <a:effectLst/>
                         <a:latin typeface="Calibri" panose="020F0502020204030204" pitchFamily="34" charset="0"/>
                         <a:ea typeface="Calibri" panose="020F0502020204030204" pitchFamily="34" charset="0"/>
@@ -7469,12 +7455,18 @@
                         </a:spcAft>
                       </a:pPr>
                       <a:r>
-                        <a:rPr lang="en-CA" sz="1400">
+                        <a:rPr lang="en-CA" sz="1400" b="1" dirty="0">
+                          <a:solidFill>
+                            <a:schemeClr val="tx1"/>
+                          </a:solidFill>
                           <a:effectLst/>
                         </a:rPr>
                         <a:t> </a:t>
                       </a:r>
-                      <a:endParaRPr lang="en-CA" sz="1200">
+                      <a:endParaRPr lang="en-CA" sz="1200" b="1" dirty="0">
+                        <a:solidFill>
+                          <a:schemeClr val="tx1"/>
+                        </a:solidFill>
                         <a:effectLst/>
                       </a:endParaRPr>
                     </a:p>
@@ -7488,12 +7480,18 @@
                         </a:spcAft>
                       </a:pPr>
                       <a:r>
-                        <a:rPr lang="en-CA" sz="1400">
+                        <a:rPr lang="en-CA" sz="1400" b="1" dirty="0">
+                          <a:solidFill>
+                            <a:schemeClr val="tx1"/>
+                          </a:solidFill>
                           <a:effectLst/>
                         </a:rPr>
                         <a:t>0.839</a:t>
                       </a:r>
-                      <a:endParaRPr lang="en-CA" sz="1200">
+                      <a:endParaRPr lang="en-CA" sz="1200" b="1" dirty="0">
+                        <a:solidFill>
+                          <a:schemeClr val="tx1"/>
+                        </a:solidFill>
                         <a:effectLst/>
                         <a:latin typeface="Calibri" panose="020F0502020204030204" pitchFamily="34" charset="0"/>
                         <a:ea typeface="Calibri" panose="020F0502020204030204" pitchFamily="34" charset="0"/>
@@ -7517,12 +7515,18 @@
                         </a:spcAft>
                       </a:pPr>
                       <a:r>
-                        <a:rPr lang="en-CA" sz="1400">
+                        <a:rPr lang="en-CA" sz="1400" b="1" dirty="0">
+                          <a:solidFill>
+                            <a:schemeClr val="tx1"/>
+                          </a:solidFill>
                           <a:effectLst/>
                         </a:rPr>
                         <a:t> </a:t>
                       </a:r>
-                      <a:endParaRPr lang="en-CA" sz="1200">
+                      <a:endParaRPr lang="en-CA" sz="1200" b="1" dirty="0">
+                        <a:solidFill>
+                          <a:schemeClr val="tx1"/>
+                        </a:solidFill>
                         <a:effectLst/>
                       </a:endParaRPr>
                     </a:p>
@@ -7536,12 +7540,18 @@
                         </a:spcAft>
                       </a:pPr>
                       <a:r>
-                        <a:rPr lang="en-CA" sz="1400">
+                        <a:rPr lang="en-CA" sz="1400" b="1" dirty="0">
+                          <a:solidFill>
+                            <a:schemeClr val="tx1"/>
+                          </a:solidFill>
                           <a:effectLst/>
                         </a:rPr>
                         <a:t>1.32</a:t>
                       </a:r>
-                      <a:endParaRPr lang="en-CA" sz="1200">
+                      <a:endParaRPr lang="en-CA" sz="1200" b="1" dirty="0">
+                        <a:solidFill>
+                          <a:schemeClr val="tx1"/>
+                        </a:solidFill>
                         <a:effectLst/>
                         <a:latin typeface="Calibri" panose="020F0502020204030204" pitchFamily="34" charset="0"/>
                         <a:ea typeface="Calibri" panose="020F0502020204030204" pitchFamily="34" charset="0"/>
@@ -7659,12 +7669,12 @@
                         </a:spcAft>
                       </a:pPr>
                       <a:r>
-                        <a:rPr lang="en-CA" sz="1400">
+                        <a:rPr lang="en-CA" sz="1400" dirty="0">
                           <a:effectLst/>
                         </a:rPr>
                         <a:t>0.981</a:t>
                       </a:r>
-                      <a:endParaRPr lang="en-CA" sz="1200">
+                      <a:endParaRPr lang="en-CA" sz="1200" dirty="0">
                         <a:effectLst/>
                         <a:latin typeface="Calibri" panose="020F0502020204030204" pitchFamily="34" charset="0"/>
                         <a:ea typeface="Calibri" panose="020F0502020204030204" pitchFamily="34" charset="0"/>
@@ -7695,12 +7705,18 @@
                         </a:spcAft>
                       </a:pPr>
                       <a:r>
-                        <a:rPr lang="en-CA" sz="1400">
+                        <a:rPr lang="en-CA" sz="1400" b="1" dirty="0">
+                          <a:solidFill>
+                            <a:schemeClr val="tx1"/>
+                          </a:solidFill>
                           <a:effectLst/>
                         </a:rPr>
                         <a:t>Exercise Induced Angina</a:t>
                       </a:r>
-                      <a:endParaRPr lang="en-CA" sz="1200">
+                      <a:endParaRPr lang="en-CA" sz="1200" b="1" dirty="0">
+                        <a:solidFill>
+                          <a:schemeClr val="tx1"/>
+                        </a:solidFill>
                         <a:effectLst/>
                         <a:latin typeface="Calibri" panose="020F0502020204030204" pitchFamily="34" charset="0"/>
                         <a:ea typeface="Calibri" panose="020F0502020204030204" pitchFamily="34" charset="0"/>
@@ -7724,12 +7740,18 @@
                         </a:spcAft>
                       </a:pPr>
                       <a:r>
-                        <a:rPr lang="en-CA" sz="1400">
+                        <a:rPr lang="en-CA" sz="1400" b="1">
+                          <a:solidFill>
+                            <a:schemeClr val="tx1"/>
+                          </a:solidFill>
                           <a:effectLst/>
                         </a:rPr>
                         <a:t>1.2</a:t>
                       </a:r>
-                      <a:endParaRPr lang="en-CA" sz="1200">
+                      <a:endParaRPr lang="en-CA" sz="1200" b="1">
+                        <a:solidFill>
+                          <a:schemeClr val="tx1"/>
+                        </a:solidFill>
                         <a:effectLst/>
                         <a:latin typeface="Calibri" panose="020F0502020204030204" pitchFamily="34" charset="0"/>
                         <a:ea typeface="Calibri" panose="020F0502020204030204" pitchFamily="34" charset="0"/>
@@ -7753,12 +7775,18 @@
                         </a:spcAft>
                       </a:pPr>
                       <a:r>
-                        <a:rPr lang="en-CA" sz="1400">
+                        <a:rPr lang="en-CA" sz="1400" b="1" dirty="0">
+                          <a:solidFill>
+                            <a:schemeClr val="tx1"/>
+                          </a:solidFill>
                           <a:effectLst/>
                         </a:rPr>
                         <a:t>0.49</a:t>
                       </a:r>
-                      <a:endParaRPr lang="en-CA" sz="1200">
+                      <a:endParaRPr lang="en-CA" sz="1200" b="1" dirty="0">
+                        <a:solidFill>
+                          <a:schemeClr val="tx1"/>
+                        </a:solidFill>
                         <a:effectLst/>
                         <a:latin typeface="Calibri" panose="020F0502020204030204" pitchFamily="34" charset="0"/>
                         <a:ea typeface="Calibri" panose="020F0502020204030204" pitchFamily="34" charset="0"/>
@@ -7782,12 +7810,18 @@
                         </a:spcAft>
                       </a:pPr>
                       <a:r>
-                        <a:rPr lang="en-CA" sz="1400">
+                        <a:rPr lang="en-CA" sz="1400" b="1" dirty="0">
+                          <a:solidFill>
+                            <a:schemeClr val="tx1"/>
+                          </a:solidFill>
                           <a:effectLst/>
                         </a:rPr>
                         <a:t>3.312</a:t>
                       </a:r>
-                      <a:endParaRPr lang="en-CA" sz="1200">
+                      <a:endParaRPr lang="en-CA" sz="1200" b="1" dirty="0">
+                        <a:solidFill>
+                          <a:schemeClr val="tx1"/>
+                        </a:solidFill>
                         <a:effectLst/>
                         <a:latin typeface="Calibri" panose="020F0502020204030204" pitchFamily="34" charset="0"/>
                         <a:ea typeface="Calibri" panose="020F0502020204030204" pitchFamily="34" charset="0"/>
@@ -7932,75 +7966,6 @@
       </p:graphicFrame>
       <p:sp>
         <p:nvSpPr>
-          <p:cNvPr id="7" name="Rectangle 2">
-            <a:extLst>
-              <a:ext uri="{FF2B5EF4-FFF2-40B4-BE49-F238E27FC236}">
-                <a16:creationId xmlns:a16="http://schemas.microsoft.com/office/drawing/2014/main" id="{E7714A51-CA62-42E2-8BCB-347DD75B7D13}"/>
-              </a:ext>
-            </a:extLst>
-          </p:cNvPr>
-          <p:cNvSpPr>
-            <a:spLocks noChangeArrowheads="1"/>
-          </p:cNvSpPr>
-          <p:nvPr/>
-        </p:nvSpPr>
-        <p:spPr bwMode="auto">
-          <a:xfrm>
-            <a:off x="5337175" y="2079625"/>
-            <a:ext cx="12192000" cy="457200"/>
-          </a:xfrm>
-          <a:prstGeom prst="rect">
-            <a:avLst/>
-          </a:prstGeom>
-          <a:noFill/>
-          <a:ln>
-            <a:noFill/>
-          </a:ln>
-          <a:effectLst/>
-          <a:extLst>
-            <a:ext uri="{909E8E84-426E-40DD-AFC4-6F175D3DCCD1}">
-              <a14:hiddenFill xmlns:a14="http://schemas.microsoft.com/office/drawing/2010/main">
-                <a:solidFill>
-                  <a:schemeClr val="accent1"/>
-                </a:solidFill>
-              </a14:hiddenFill>
-            </a:ext>
-            <a:ext uri="{91240B29-F687-4F45-9708-019B960494DF}">
-              <a14:hiddenLine xmlns:a14="http://schemas.microsoft.com/office/drawing/2010/main" w="9525">
-                <a:solidFill>
-                  <a:schemeClr val="tx1"/>
-                </a:solidFill>
-                <a:miter lim="800000"/>
-                <a:headEnd/>
-                <a:tailEnd/>
-              </a14:hiddenLine>
-            </a:ext>
-            <a:ext uri="{AF507438-7753-43E0-B8FC-AC1667EBCBE1}">
-              <a14:hiddenEffects xmlns:a14="http://schemas.microsoft.com/office/drawing/2010/main">
-                <a:effectLst>
-                  <a:outerShdw dist="35921" dir="2700000" algn="ctr" rotWithShape="0">
-                    <a:schemeClr val="bg2"/>
-                  </a:outerShdw>
-                </a:effectLst>
-              </a14:hiddenEffects>
-            </a:ext>
-          </a:extLst>
-        </p:spPr>
-        <p:txBody>
-          <a:bodyPr vert="horz" wrap="none" lIns="91440" tIns="45720" rIns="91440" bIns="45720" numCol="1" anchor="ctr" anchorCtr="0" compatLnSpc="1">
-            <a:prstTxWarp prst="textNoShape">
-              <a:avLst/>
-            </a:prstTxWarp>
-            <a:spAutoFit/>
-          </a:bodyPr>
-          <a:lstStyle/>
-          <a:p>
-            <a:endParaRPr lang="en-CA"/>
-          </a:p>
-        </p:txBody>
-      </p:sp>
-      <p:sp>
-        <p:nvSpPr>
           <p:cNvPr id="10" name="TextBox 9">
             <a:extLst>
               <a:ext uri="{FF2B5EF4-FFF2-40B4-BE49-F238E27FC236}">
@@ -8013,8 +7978,8 @@
         </p:nvSpPr>
         <p:spPr>
           <a:xfrm>
-            <a:off x="7029488" y="1859339"/>
-            <a:ext cx="4837655" cy="3139321"/>
+            <a:off x="7125022" y="2713786"/>
+            <a:ext cx="4837655" cy="2031325"/>
           </a:xfrm>
           <a:prstGeom prst="rect">
             <a:avLst/>
@@ -8033,7 +7998,23 @@
             </a:pPr>
             <a:r>
               <a:rPr lang="en-CA" dirty="0"/>
-              <a:t>Coefficients of a logistic regression are hard to interpret </a:t>
+              <a:t>Features with the most impact are ones with the </a:t>
+            </a:r>
+            <a:r>
+              <a:rPr lang="en-CA" b="1" dirty="0"/>
+              <a:t>highest</a:t>
+            </a:r>
+            <a:r>
+              <a:rPr lang="en-CA" dirty="0"/>
+              <a:t> odds ratio and </a:t>
+            </a:r>
+            <a:r>
+              <a:rPr lang="en-CA" b="1" dirty="0"/>
+              <a:t>smallest</a:t>
+            </a:r>
+            <a:r>
+              <a:rPr lang="en-CA" dirty="0"/>
+              <a:t> standard error</a:t>
             </a:r>
           </a:p>
           <a:p>
@@ -8043,43 +8024,7 @@
             </a:pPr>
             <a:r>
               <a:rPr lang="en-CA" dirty="0"/>
-              <a:t>For interpretation we transform coefficients into odds ratio</a:t>
-            </a:r>
-          </a:p>
-          <a:p>
-            <a:pPr marL="285750" indent="-285750">
-              <a:buFont typeface="Arial" panose="020B0604020202020204" pitchFamily="34" charset="0"/>
-              <a:buChar char="•"/>
-            </a:pPr>
-            <a:r>
-              <a:rPr lang="en-CA" dirty="0"/>
-              <a:t>Features with the most impact are ones with the </a:t>
-            </a:r>
-            <a:r>
-              <a:rPr lang="en-CA" b="1" dirty="0"/>
-              <a:t>highest</a:t>
-            </a:r>
-            <a:r>
-              <a:rPr lang="en-CA" dirty="0"/>
-              <a:t> odds ratio and </a:t>
-            </a:r>
-            <a:r>
-              <a:rPr lang="en-CA" b="1" dirty="0"/>
-              <a:t>smallest</a:t>
-            </a:r>
-            <a:r>
-              <a:rPr lang="en-CA" dirty="0"/>
-              <a:t> standard error</a:t>
-            </a:r>
-          </a:p>
-          <a:p>
-            <a:pPr marL="285750" indent="-285750">
-              <a:buFont typeface="Arial" panose="020B0604020202020204" pitchFamily="34" charset="0"/>
-              <a:buChar char="•"/>
-            </a:pPr>
-            <a:r>
-              <a:rPr lang="en-CA" dirty="0"/>
-              <a:t>In this case, we see the standout features are gender, chest pain, fasting blood sugar, resting electrocardiographic results and exercise induced angina</a:t>
+              <a:t>In this case, we see the standout features are sex, chest pain, fasting blood sugar, resting electrocardiographic results and exercise induced angina</a:t>
             </a:r>
           </a:p>
         </p:txBody>
@@ -8424,7 +8369,19 @@
           <a:p>
             <a:r>
               <a:rPr lang="en-CA" dirty="0"/>
-              <a:t>We evaluate the competency of our model using several approaches. For this presentation, we will focus on a confusion matrix and an ROC curve.</a:t>
+              <a:t>We evaluate the competency of our model using several approaches. For this presentation, we will focus on a </a:t>
+            </a:r>
+            <a:r>
+              <a:rPr lang="en-CA" b="1" dirty="0"/>
+              <a:t>confusion matrix </a:t>
+            </a:r>
+            <a:r>
+              <a:rPr lang="en-CA" dirty="0"/>
+              <a:t>and an </a:t>
+            </a:r>
+            <a:r>
+              <a:rPr lang="en-CA" b="1" dirty="0"/>
+              <a:t>ROC curve.</a:t>
             </a:r>
           </a:p>
         </p:txBody>
@@ -8809,8 +8766,8 @@
         </p:nvSpPr>
         <p:spPr>
           <a:xfrm>
-            <a:off x="872973" y="5076967"/>
-            <a:ext cx="4464202" cy="923330"/>
+            <a:off x="872973" y="4984633"/>
+            <a:ext cx="4464202" cy="646331"/>
           </a:xfrm>
           <a:prstGeom prst="rect">
             <a:avLst/>
@@ -8829,17 +8786,7 @@
             </a:pPr>
             <a:r>
               <a:rPr lang="en-CA" dirty="0"/>
-              <a:t>The greater the area under our ROC curve, the more favourable is our model.</a:t>
-            </a:r>
-          </a:p>
-          <a:p>
-            <a:pPr marL="285750" indent="-285750">
-              <a:buFont typeface="Arial" panose="020B0604020202020204" pitchFamily="34" charset="0"/>
-              <a:buChar char="•"/>
-            </a:pPr>
-            <a:r>
-              <a:rPr lang="en-CA" dirty="0"/>
-              <a:t>Based on the latter, our model faired well.</a:t>
+              <a:t>The greater the area under our ROC curve, the more favourable is our model. (~78%)</a:t>
             </a:r>
           </a:p>
         </p:txBody>
@@ -8859,7 +8806,7 @@
         <p:spPr>
           <a:xfrm>
             <a:off x="5929894" y="4938467"/>
-            <a:ext cx="5937250" cy="1200329"/>
+            <a:ext cx="5937250" cy="369332"/>
           </a:xfrm>
           <a:prstGeom prst="rect">
             <a:avLst/>
@@ -8871,16 +8818,6 @@
             <a:spAutoFit/>
           </a:bodyPr>
           <a:lstStyle/>
-          <a:p>
-            <a:pPr marL="285750" indent="-285750">
-              <a:buFont typeface="Arial" panose="020B0604020202020204" pitchFamily="34" charset="0"/>
-              <a:buChar char="•"/>
-            </a:pPr>
-            <a:r>
-              <a:rPr lang="en-CA" dirty="0"/>
-              <a:t>In a confusion matrix, we want to focus on the True Positive Rate and True Negative Rate (the whole numbers are in bold above)</a:t>
-            </a:r>
-          </a:p>
           <a:p>
             <a:pPr marL="285750" indent="-285750">
               <a:buFont typeface="Arial" panose="020B0604020202020204" pitchFamily="34" charset="0"/>
@@ -9076,8 +9013,8 @@
         </p:nvSpPr>
         <p:spPr>
           <a:xfrm>
-            <a:off x="6595520" y="2704071"/>
-            <a:ext cx="4837655" cy="2031325"/>
+            <a:off x="5940427" y="3429000"/>
+            <a:ext cx="5926717" cy="923330"/>
           </a:xfrm>
           <a:prstGeom prst="rect">
             <a:avLst/>
@@ -9096,7 +9033,7 @@
             </a:pPr>
             <a:r>
               <a:rPr lang="en-CA" dirty="0"/>
-              <a:t>Unlike the previous model, a random forest is able to compute each individual feature importance </a:t>
+              <a:t>From the plot, we see that there are two major stand out features</a:t>
             </a:r>
           </a:p>
           <a:p>
@@ -9106,31 +9043,23 @@
             </a:pPr>
             <a:r>
               <a:rPr lang="en-CA" dirty="0"/>
-              <a:t>From the plot, we see that there are three major stand out features</a:t>
-            </a:r>
-          </a:p>
-          <a:p>
-            <a:pPr marL="285750" indent="-285750">
-              <a:buFont typeface="Arial" panose="020B0604020202020204" pitchFamily="34" charset="0"/>
-              <a:buChar char="•"/>
-            </a:pPr>
-            <a:r>
-              <a:rPr lang="en-CA" dirty="0"/>
-              <a:t>These features are age, serum cholesterol levels and exercise induced angina</a:t>
+              <a:t>These features are MHRA and EIA</a:t>
             </a:r>
           </a:p>
         </p:txBody>
       </p:sp>
       <p:pic>
         <p:nvPicPr>
-          <p:cNvPr id="8" name="Picture 7">
+          <p:cNvPr id="5" name="Picture 4">
             <a:extLst>
               <a:ext uri="{FF2B5EF4-FFF2-40B4-BE49-F238E27FC236}">
-                <a16:creationId xmlns:a16="http://schemas.microsoft.com/office/drawing/2014/main" id="{2B7B107E-10AD-49A4-983F-701F03AC285A}"/>
+                <a16:creationId xmlns:a16="http://schemas.microsoft.com/office/drawing/2014/main" id="{BB56C404-4F18-452D-8045-5527F50ADB48}"/>
               </a:ext>
             </a:extLst>
           </p:cNvPr>
-          <p:cNvPicPr/>
+          <p:cNvPicPr>
+            <a:picLocks noChangeAspect="1"/>
+          </p:cNvPicPr>
           <p:nvPr/>
         </p:nvPicPr>
         <p:blipFill>
@@ -9141,23 +9070,18 @@
               </a:ext>
             </a:extLst>
           </a:blip>
-          <a:srcRect/>
           <a:stretch>
             <a:fillRect/>
           </a:stretch>
         </p:blipFill>
-        <p:spPr bwMode="auto">
-          <a:xfrm>
-            <a:off x="503583" y="1827503"/>
-            <a:ext cx="5532887" cy="3784462"/>
+        <p:spPr>
+          <a:xfrm>
+            <a:off x="503583" y="2081024"/>
+            <a:ext cx="5092898" cy="3612256"/>
           </a:xfrm>
           <a:prstGeom prst="rect">
             <a:avLst/>
           </a:prstGeom>
-          <a:noFill/>
-          <a:ln>
-            <a:noFill/>
-          </a:ln>
         </p:spPr>
       </p:pic>
     </p:spTree>
@@ -9259,7 +9183,7 @@
             </a:r>
             <a:r>
               <a:rPr lang="en-CA" b="1" dirty="0"/>
-              <a:t>mean squared error (MSE) </a:t>
+              <a:t>F1-Score </a:t>
             </a:r>
             <a:r>
               <a:rPr lang="en-CA" dirty="0"/>
@@ -9360,7 +9284,7 @@
           <p:nvPr>
             <p:extLst>
               <p:ext uri="{D42A27DB-BD31-4B8C-83A1-F6EECF244321}">
-                <p14:modId xmlns:p14="http://schemas.microsoft.com/office/powerpoint/2010/main" val="2304312447"/>
+                <p14:modId xmlns:p14="http://schemas.microsoft.com/office/powerpoint/2010/main" val="657153566"/>
               </p:ext>
             </p:extLst>
           </p:nvPr>
@@ -9529,15 +9453,15 @@
                         </a:spcAft>
                       </a:pPr>
                       <a:r>
-                        <a:rPr lang="en-CA" sz="2000" b="0">
+                        <a:rPr lang="en-CA" sz="2000" b="0" dirty="0">
                           <a:solidFill>
                             <a:schemeClr val="tx1"/>
                           </a:solidFill>
                           <a:effectLst/>
                         </a:rPr>
-                        <a:t>0.88</a:t>
+                        <a:t>0.98</a:t>
                       </a:r>
-                      <a:endParaRPr lang="en-CA" sz="1800" b="0">
+                      <a:endParaRPr lang="en-CA" sz="1800" b="0" dirty="0">
                         <a:solidFill>
                           <a:schemeClr val="tx1"/>
                         </a:solidFill>
@@ -9574,7 +9498,7 @@
                           </a:solidFill>
                           <a:effectLst/>
                         </a:rPr>
-                        <a:t>0.3</a:t>
+                        <a:t>0.75</a:t>
                       </a:r>
                       <a:endParaRPr lang="en-CA" sz="1800" b="0" dirty="0">
                         <a:solidFill>
@@ -9603,12 +9527,51 @@
           </a:graphicData>
         </a:graphic>
       </p:graphicFrame>
+      <p:sp>
+        <p:nvSpPr>
+          <p:cNvPr id="9" name="TextBox 8">
+            <a:extLst>
+              <a:ext uri="{FF2B5EF4-FFF2-40B4-BE49-F238E27FC236}">
+                <a16:creationId xmlns:a16="http://schemas.microsoft.com/office/drawing/2014/main" id="{F3C11004-CA99-41D4-8BE2-1D3B4FF272E6}"/>
+              </a:ext>
+            </a:extLst>
+          </p:cNvPr>
+          <p:cNvSpPr txBox="1"/>
+          <p:nvPr/>
+        </p:nvSpPr>
+        <p:spPr>
+          <a:xfrm>
+            <a:off x="503583" y="4014988"/>
+            <a:ext cx="4833592" cy="646331"/>
+          </a:xfrm>
+          <a:prstGeom prst="rect">
+            <a:avLst/>
+          </a:prstGeom>
+          <a:noFill/>
+        </p:spPr>
+        <p:txBody>
+          <a:bodyPr wrap="square" rtlCol="0">
+            <a:spAutoFit/>
+          </a:bodyPr>
+          <a:lstStyle/>
+          <a:p>
+            <a:pPr marL="285750" indent="-285750">
+              <a:buFont typeface="Arial" panose="020B0604020202020204" pitchFamily="34" charset="0"/>
+              <a:buChar char="•"/>
+            </a:pPr>
+            <a:r>
+              <a:rPr lang="en-CA" dirty="0"/>
+              <a:t>Our model performed well on the training set but lacked quality in predicting the test set </a:t>
+            </a:r>
+          </a:p>
+        </p:txBody>
+      </p:sp>
       <p:graphicFrame>
         <p:nvGraphicFramePr>
-          <p:cNvPr id="5" name="Table 4">
+          <p:cNvPr id="6" name="Table 5">
             <a:extLst>
               <a:ext uri="{FF2B5EF4-FFF2-40B4-BE49-F238E27FC236}">
-                <a16:creationId xmlns:a16="http://schemas.microsoft.com/office/drawing/2014/main" id="{BB7CCC70-8B56-4ED1-9F5B-DA10F402CA2D}"/>
+                <a16:creationId xmlns:a16="http://schemas.microsoft.com/office/drawing/2014/main" id="{EADC4135-E37A-4DF8-BAF5-2116741E1624}"/>
               </a:ext>
             </a:extLst>
           </p:cNvPr>
@@ -9618,14 +9581,14 @@
           <p:nvPr>
             <p:extLst>
               <p:ext uri="{D42A27DB-BD31-4B8C-83A1-F6EECF244321}">
-                <p14:modId xmlns:p14="http://schemas.microsoft.com/office/powerpoint/2010/main" val="3067083526"/>
+                <p14:modId xmlns:p14="http://schemas.microsoft.com/office/powerpoint/2010/main" val="4007225660"/>
               </p:ext>
             </p:extLst>
           </p:nvPr>
         </p:nvGraphicFramePr>
         <p:xfrm>
-          <a:off x="6095999" y="2352890"/>
-          <a:ext cx="5592418" cy="949452"/>
+          <a:off x="5651074" y="2308225"/>
+          <a:ext cx="5937250" cy="1121920"/>
         </p:xfrm>
         <a:graphic>
           <a:graphicData uri="http://schemas.openxmlformats.org/drawingml/2006/table">
@@ -9634,22 +9597,36 @@
                 <a:tableStyleId>{5C22544A-7EE6-4342-B048-85BDC9FD1C3A}</a:tableStyleId>
               </a:tblPr>
               <a:tblGrid>
-                <a:gridCol w="2796209">
+                <a:gridCol w="1483995">
                   <a:extLst>
                     <a:ext uri="{9D8B030D-6E8A-4147-A177-3AD203B41FA5}">
-                      <a16:colId xmlns:a16="http://schemas.microsoft.com/office/drawing/2014/main" val="1570894617"/>
+                      <a16:colId xmlns:a16="http://schemas.microsoft.com/office/drawing/2014/main" val="1462304750"/>
                     </a:ext>
                   </a:extLst>
                 </a:gridCol>
-                <a:gridCol w="2796209">
+                <a:gridCol w="1483995">
                   <a:extLst>
                     <a:ext uri="{9D8B030D-6E8A-4147-A177-3AD203B41FA5}">
-                      <a16:colId xmlns:a16="http://schemas.microsoft.com/office/drawing/2014/main" val="769732071"/>
+                      <a16:colId xmlns:a16="http://schemas.microsoft.com/office/drawing/2014/main" val="3383692193"/>
+                    </a:ext>
+                  </a:extLst>
+                </a:gridCol>
+                <a:gridCol w="1484630">
+                  <a:extLst>
+                    <a:ext uri="{9D8B030D-6E8A-4147-A177-3AD203B41FA5}">
+                      <a16:colId xmlns:a16="http://schemas.microsoft.com/office/drawing/2014/main" val="567549881"/>
+                    </a:ext>
+                  </a:extLst>
+                </a:gridCol>
+                <a:gridCol w="1484630">
+                  <a:extLst>
+                    <a:ext uri="{9D8B030D-6E8A-4147-A177-3AD203B41FA5}">
+                      <a16:colId xmlns:a16="http://schemas.microsoft.com/office/drawing/2014/main" val="576909701"/>
                     </a:ext>
                   </a:extLst>
                 </a:gridCol>
               </a:tblGrid>
-              <a:tr h="637789">
+              <a:tr h="237363">
                 <a:tc>
                   <a:txBody>
                     <a:bodyPr/>
@@ -9664,34 +9641,15 @@
                         </a:spcAft>
                       </a:pPr>
                       <a:r>
-                        <a:rPr lang="en-CA" sz="1800" b="1" dirty="0">
+                        <a:rPr lang="en-CA" sz="1800" dirty="0">
                           <a:solidFill>
                             <a:schemeClr val="tx1"/>
                           </a:solidFill>
                           <a:effectLst/>
                         </a:rPr>
-                        <a:t>MSE on the </a:t>
+                        <a:t> </a:t>
                       </a:r>
-                    </a:p>
-                    <a:p>
-                      <a:pPr algn="ctr">
-                        <a:lnSpc>
-                          <a:spcPct val="107000"/>
-                        </a:lnSpc>
-                        <a:spcAft>
-                          <a:spcPts val="0"/>
-                        </a:spcAft>
-                      </a:pPr>
-                      <a:r>
-                        <a:rPr lang="en-CA" sz="1800" b="1" dirty="0">
-                          <a:solidFill>
-                            <a:schemeClr val="tx1"/>
-                          </a:solidFill>
-                          <a:effectLst/>
-                        </a:rPr>
-                        <a:t>Training Set</a:t>
-                      </a:r>
-                      <a:endParaRPr lang="en-CA" sz="1600" b="1" dirty="0">
+                      <a:endParaRPr lang="en-CA" sz="1600" dirty="0">
                         <a:solidFill>
                           <a:schemeClr val="tx1"/>
                         </a:solidFill>
@@ -9722,80 +9680,15 @@
                         </a:spcAft>
                       </a:pPr>
                       <a:r>
-                        <a:rPr lang="en-CA" sz="1800" b="1" dirty="0">
+                        <a:rPr lang="en-CA" sz="1800">
                           <a:solidFill>
                             <a:schemeClr val="tx1"/>
                           </a:solidFill>
                           <a:effectLst/>
                         </a:rPr>
-                        <a:t>MSE on the </a:t>
+                        <a:t>Precision</a:t>
                       </a:r>
-                    </a:p>
-                    <a:p>
-                      <a:pPr algn="ctr">
-                        <a:lnSpc>
-                          <a:spcPct val="107000"/>
-                        </a:lnSpc>
-                        <a:spcAft>
-                          <a:spcPts val="0"/>
-                        </a:spcAft>
-                      </a:pPr>
-                      <a:r>
-                        <a:rPr lang="en-CA" sz="1800" b="1" dirty="0">
-                          <a:solidFill>
-                            <a:schemeClr val="tx1"/>
-                          </a:solidFill>
-                          <a:effectLst/>
-                        </a:rPr>
-                        <a:t>Test Set</a:t>
-                      </a:r>
-                      <a:endParaRPr lang="en-CA" sz="1600" b="1" dirty="0">
-                        <a:solidFill>
-                          <a:schemeClr val="tx1"/>
-                        </a:solidFill>
-                        <a:effectLst/>
-                        <a:latin typeface="Calibri" panose="020F0502020204030204" pitchFamily="34" charset="0"/>
-                        <a:ea typeface="Calibri" panose="020F0502020204030204" pitchFamily="34" charset="0"/>
-                        <a:cs typeface="Times New Roman" panose="02020603050405020304" pitchFamily="18" charset="0"/>
-                      </a:endParaRPr>
-                    </a:p>
-                  </a:txBody>
-                  <a:tcPr marL="68580" marR="68580" marT="0" marB="0">
-                    <a:solidFill>
-                      <a:srgbClr val="FFC000"/>
-                    </a:solidFill>
-                  </a:tcPr>
-                </a:tc>
-                <a:extLst>
-                  <a:ext uri="{0D108BD9-81ED-4DB2-BD59-A6C34878D82A}">
-                    <a16:rowId xmlns:a16="http://schemas.microsoft.com/office/drawing/2014/main" val="965531740"/>
-                  </a:ext>
-                </a:extLst>
-              </a:tr>
-              <a:tr h="311663">
-                <a:tc>
-                  <a:txBody>
-                    <a:bodyPr/>
-                    <a:lstStyle/>
-                    <a:p>
-                      <a:pPr algn="ctr">
-                        <a:lnSpc>
-                          <a:spcPct val="107000"/>
-                        </a:lnSpc>
-                        <a:spcAft>
-                          <a:spcPts val="0"/>
-                        </a:spcAft>
-                      </a:pPr>
-                      <a:r>
-                        <a:rPr lang="en-CA" sz="1800" b="0" dirty="0">
-                          <a:solidFill>
-                            <a:schemeClr val="tx1"/>
-                          </a:solidFill>
-                          <a:effectLst/>
-                        </a:rPr>
-                        <a:t>0.172</a:t>
-                      </a:r>
-                      <a:endParaRPr lang="en-CA" sz="1600" b="0" dirty="0">
+                      <a:endParaRPr lang="en-CA" sz="1600">
                         <a:solidFill>
                           <a:schemeClr val="tx1"/>
                         </a:solidFill>
@@ -9826,15 +9719,54 @@
                         </a:spcAft>
                       </a:pPr>
                       <a:r>
-                        <a:rPr lang="en-CA" sz="1800" b="0" dirty="0">
+                        <a:rPr lang="en-CA" sz="1800" dirty="0">
                           <a:solidFill>
                             <a:schemeClr val="tx1"/>
                           </a:solidFill>
                           <a:effectLst/>
                         </a:rPr>
-                        <a:t>0.03</a:t>
+                        <a:t>Recall</a:t>
                       </a:r>
-                      <a:endParaRPr lang="en-CA" sz="1600" b="0" dirty="0">
+                      <a:endParaRPr lang="en-CA" sz="1600" dirty="0">
+                        <a:solidFill>
+                          <a:schemeClr val="tx1"/>
+                        </a:solidFill>
+                        <a:effectLst/>
+                        <a:latin typeface="Calibri" panose="020F0502020204030204" pitchFamily="34" charset="0"/>
+                        <a:ea typeface="Calibri" panose="020F0502020204030204" pitchFamily="34" charset="0"/>
+                        <a:cs typeface="Times New Roman" panose="02020603050405020304" pitchFamily="18" charset="0"/>
+                      </a:endParaRPr>
+                    </a:p>
+                  </a:txBody>
+                  <a:tcPr marL="68580" marR="68580" marT="0" marB="0">
+                    <a:solidFill>
+                      <a:srgbClr val="FFC000"/>
+                    </a:solidFill>
+                  </a:tcPr>
+                </a:tc>
+                <a:tc>
+                  <a:txBody>
+                    <a:bodyPr/>
+                    <a:lstStyle/>
+                    <a:p>
+                      <a:pPr algn="ctr">
+                        <a:lnSpc>
+                          <a:spcPct val="107000"/>
+                        </a:lnSpc>
+                        <a:spcAft>
+                          <a:spcPts val="0"/>
+                        </a:spcAft>
+                      </a:pPr>
+                      <a:r>
+                        <a:rPr lang="en-CA" sz="1800">
+                          <a:solidFill>
+                            <a:schemeClr val="tx1"/>
+                          </a:solidFill>
+                          <a:effectLst/>
+                        </a:rPr>
+                        <a:t>F1-Score</a:t>
+                      </a:r>
+                      <a:endParaRPr lang="en-CA" sz="1600">
                         <a:solidFill>
                           <a:schemeClr val="tx1"/>
                         </a:solidFill>
@@ -9853,7 +9785,496 @@
                 </a:tc>
                 <a:extLst>
                   <a:ext uri="{0D108BD9-81ED-4DB2-BD59-A6C34878D82A}">
-                    <a16:rowId xmlns:a16="http://schemas.microsoft.com/office/drawing/2014/main" val="2084130946"/>
+                    <a16:rowId xmlns:a16="http://schemas.microsoft.com/office/drawing/2014/main" val="39072506"/>
+                  </a:ext>
+                </a:extLst>
+              </a:tr>
+              <a:tr h="237363">
+                <a:tc>
+                  <a:txBody>
+                    <a:bodyPr/>
+                    <a:lstStyle/>
+                    <a:p>
+                      <a:pPr algn="ctr">
+                        <a:lnSpc>
+                          <a:spcPct val="107000"/>
+                        </a:lnSpc>
+                        <a:spcAft>
+                          <a:spcPts val="0"/>
+                        </a:spcAft>
+                      </a:pPr>
+                      <a:r>
+                        <a:rPr lang="en-CA" sz="1800">
+                          <a:solidFill>
+                            <a:schemeClr val="tx1"/>
+                          </a:solidFill>
+                          <a:effectLst/>
+                        </a:rPr>
+                        <a:t>0</a:t>
+                      </a:r>
+                      <a:endParaRPr lang="en-CA" sz="1600">
+                        <a:solidFill>
+                          <a:schemeClr val="tx1"/>
+                        </a:solidFill>
+                        <a:effectLst/>
+                        <a:latin typeface="Calibri" panose="020F0502020204030204" pitchFamily="34" charset="0"/>
+                        <a:ea typeface="Calibri" panose="020F0502020204030204" pitchFamily="34" charset="0"/>
+                        <a:cs typeface="Times New Roman" panose="02020603050405020304" pitchFamily="18" charset="0"/>
+                      </a:endParaRPr>
+                    </a:p>
+                  </a:txBody>
+                  <a:tcPr marL="68580" marR="68580" marT="0" marB="0">
+                    <a:solidFill>
+                      <a:srgbClr val="FFC000"/>
+                    </a:solidFill>
+                  </a:tcPr>
+                </a:tc>
+                <a:tc>
+                  <a:txBody>
+                    <a:bodyPr/>
+                    <a:lstStyle/>
+                    <a:p>
+                      <a:pPr algn="ctr">
+                        <a:lnSpc>
+                          <a:spcPct val="107000"/>
+                        </a:lnSpc>
+                        <a:spcAft>
+                          <a:spcPts val="0"/>
+                        </a:spcAft>
+                      </a:pPr>
+                      <a:r>
+                        <a:rPr lang="en-CA" sz="1800">
+                          <a:solidFill>
+                            <a:schemeClr val="tx1"/>
+                          </a:solidFill>
+                          <a:effectLst/>
+                        </a:rPr>
+                        <a:t>0.67</a:t>
+                      </a:r>
+                      <a:endParaRPr lang="en-CA" sz="1600">
+                        <a:solidFill>
+                          <a:schemeClr val="tx1"/>
+                        </a:solidFill>
+                        <a:effectLst/>
+                        <a:latin typeface="Calibri" panose="020F0502020204030204" pitchFamily="34" charset="0"/>
+                        <a:ea typeface="Calibri" panose="020F0502020204030204" pitchFamily="34" charset="0"/>
+                        <a:cs typeface="Times New Roman" panose="02020603050405020304" pitchFamily="18" charset="0"/>
+                      </a:endParaRPr>
+                    </a:p>
+                  </a:txBody>
+                  <a:tcPr marL="68580" marR="68580" marT="0" marB="0">
+                    <a:solidFill>
+                      <a:srgbClr val="FFC000"/>
+                    </a:solidFill>
+                  </a:tcPr>
+                </a:tc>
+                <a:tc>
+                  <a:txBody>
+                    <a:bodyPr/>
+                    <a:lstStyle/>
+                    <a:p>
+                      <a:pPr algn="ctr">
+                        <a:lnSpc>
+                          <a:spcPct val="107000"/>
+                        </a:lnSpc>
+                        <a:spcAft>
+                          <a:spcPts val="0"/>
+                        </a:spcAft>
+                      </a:pPr>
+                      <a:r>
+                        <a:rPr lang="en-CA" sz="1800">
+                          <a:solidFill>
+                            <a:schemeClr val="tx1"/>
+                          </a:solidFill>
+                          <a:effectLst/>
+                        </a:rPr>
+                        <a:t>0.82</a:t>
+                      </a:r>
+                      <a:endParaRPr lang="en-CA" sz="1600">
+                        <a:solidFill>
+                          <a:schemeClr val="tx1"/>
+                        </a:solidFill>
+                        <a:effectLst/>
+                        <a:latin typeface="Calibri" panose="020F0502020204030204" pitchFamily="34" charset="0"/>
+                        <a:ea typeface="Calibri" panose="020F0502020204030204" pitchFamily="34" charset="0"/>
+                        <a:cs typeface="Times New Roman" panose="02020603050405020304" pitchFamily="18" charset="0"/>
+                      </a:endParaRPr>
+                    </a:p>
+                  </a:txBody>
+                  <a:tcPr marL="68580" marR="68580" marT="0" marB="0">
+                    <a:solidFill>
+                      <a:srgbClr val="FFC000"/>
+                    </a:solidFill>
+                  </a:tcPr>
+                </a:tc>
+                <a:tc>
+                  <a:txBody>
+                    <a:bodyPr/>
+                    <a:lstStyle/>
+                    <a:p>
+                      <a:pPr algn="ctr">
+                        <a:lnSpc>
+                          <a:spcPct val="107000"/>
+                        </a:lnSpc>
+                        <a:spcAft>
+                          <a:spcPts val="0"/>
+                        </a:spcAft>
+                      </a:pPr>
+                      <a:r>
+                        <a:rPr lang="en-CA" sz="1800" dirty="0">
+                          <a:solidFill>
+                            <a:schemeClr val="tx1"/>
+                          </a:solidFill>
+                          <a:effectLst/>
+                        </a:rPr>
+                        <a:t>97</a:t>
+                      </a:r>
+                      <a:endParaRPr lang="en-CA" sz="1600" dirty="0">
+                        <a:solidFill>
+                          <a:schemeClr val="tx1"/>
+                        </a:solidFill>
+                        <a:effectLst/>
+                        <a:latin typeface="Calibri" panose="020F0502020204030204" pitchFamily="34" charset="0"/>
+                        <a:ea typeface="Calibri" panose="020F0502020204030204" pitchFamily="34" charset="0"/>
+                        <a:cs typeface="Times New Roman" panose="02020603050405020304" pitchFamily="18" charset="0"/>
+                      </a:endParaRPr>
+                    </a:p>
+                  </a:txBody>
+                  <a:tcPr marL="68580" marR="68580" marT="0" marB="0">
+                    <a:solidFill>
+                      <a:srgbClr val="FFC000"/>
+                    </a:solidFill>
+                  </a:tcPr>
+                </a:tc>
+                <a:extLst>
+                  <a:ext uri="{0D108BD9-81ED-4DB2-BD59-A6C34878D82A}">
+                    <a16:rowId xmlns:a16="http://schemas.microsoft.com/office/drawing/2014/main" val="1077852790"/>
+                  </a:ext>
+                </a:extLst>
+              </a:tr>
+              <a:tr h="237363">
+                <a:tc>
+                  <a:txBody>
+                    <a:bodyPr/>
+                    <a:lstStyle/>
+                    <a:p>
+                      <a:pPr algn="ctr">
+                        <a:lnSpc>
+                          <a:spcPct val="107000"/>
+                        </a:lnSpc>
+                        <a:spcAft>
+                          <a:spcPts val="0"/>
+                        </a:spcAft>
+                      </a:pPr>
+                      <a:r>
+                        <a:rPr lang="en-CA" sz="1800">
+                          <a:solidFill>
+                            <a:schemeClr val="tx1"/>
+                          </a:solidFill>
+                          <a:effectLst/>
+                        </a:rPr>
+                        <a:t>1</a:t>
+                      </a:r>
+                      <a:endParaRPr lang="en-CA" sz="1600">
+                        <a:solidFill>
+                          <a:schemeClr val="tx1"/>
+                        </a:solidFill>
+                        <a:effectLst/>
+                        <a:latin typeface="Calibri" panose="020F0502020204030204" pitchFamily="34" charset="0"/>
+                        <a:ea typeface="Calibri" panose="020F0502020204030204" pitchFamily="34" charset="0"/>
+                        <a:cs typeface="Times New Roman" panose="02020603050405020304" pitchFamily="18" charset="0"/>
+                      </a:endParaRPr>
+                    </a:p>
+                  </a:txBody>
+                  <a:tcPr marL="68580" marR="68580" marT="0" marB="0">
+                    <a:solidFill>
+                      <a:srgbClr val="FFC000"/>
+                    </a:solidFill>
+                  </a:tcPr>
+                </a:tc>
+                <a:tc>
+                  <a:txBody>
+                    <a:bodyPr/>
+                    <a:lstStyle/>
+                    <a:p>
+                      <a:pPr algn="ctr">
+                        <a:lnSpc>
+                          <a:spcPct val="107000"/>
+                        </a:lnSpc>
+                        <a:spcAft>
+                          <a:spcPts val="0"/>
+                        </a:spcAft>
+                      </a:pPr>
+                      <a:r>
+                        <a:rPr lang="en-CA" sz="1800">
+                          <a:solidFill>
+                            <a:schemeClr val="tx1"/>
+                          </a:solidFill>
+                          <a:effectLst/>
+                        </a:rPr>
+                        <a:t>0.83</a:t>
+                      </a:r>
+                      <a:endParaRPr lang="en-CA" sz="1600">
+                        <a:solidFill>
+                          <a:schemeClr val="tx1"/>
+                        </a:solidFill>
+                        <a:effectLst/>
+                        <a:latin typeface="Calibri" panose="020F0502020204030204" pitchFamily="34" charset="0"/>
+                        <a:ea typeface="Calibri" panose="020F0502020204030204" pitchFamily="34" charset="0"/>
+                        <a:cs typeface="Times New Roman" panose="02020603050405020304" pitchFamily="18" charset="0"/>
+                      </a:endParaRPr>
+                    </a:p>
+                  </a:txBody>
+                  <a:tcPr marL="68580" marR="68580" marT="0" marB="0">
+                    <a:solidFill>
+                      <a:srgbClr val="FFC000"/>
+                    </a:solidFill>
+                  </a:tcPr>
+                </a:tc>
+                <a:tc>
+                  <a:txBody>
+                    <a:bodyPr/>
+                    <a:lstStyle/>
+                    <a:p>
+                      <a:pPr algn="ctr">
+                        <a:lnSpc>
+                          <a:spcPct val="107000"/>
+                        </a:lnSpc>
+                        <a:spcAft>
+                          <a:spcPts val="0"/>
+                        </a:spcAft>
+                      </a:pPr>
+                      <a:r>
+                        <a:rPr lang="en-CA" sz="1800">
+                          <a:solidFill>
+                            <a:schemeClr val="tx1"/>
+                          </a:solidFill>
+                          <a:effectLst/>
+                        </a:rPr>
+                        <a:t>0.69</a:t>
+                      </a:r>
+                      <a:endParaRPr lang="en-CA" sz="1600">
+                        <a:solidFill>
+                          <a:schemeClr val="tx1"/>
+                        </a:solidFill>
+                        <a:effectLst/>
+                        <a:latin typeface="Calibri" panose="020F0502020204030204" pitchFamily="34" charset="0"/>
+                        <a:ea typeface="Calibri" panose="020F0502020204030204" pitchFamily="34" charset="0"/>
+                        <a:cs typeface="Times New Roman" panose="02020603050405020304" pitchFamily="18" charset="0"/>
+                      </a:endParaRPr>
+                    </a:p>
+                  </a:txBody>
+                  <a:tcPr marL="68580" marR="68580" marT="0" marB="0">
+                    <a:solidFill>
+                      <a:srgbClr val="FFC000"/>
+                    </a:solidFill>
+                  </a:tcPr>
+                </a:tc>
+                <a:tc>
+                  <a:txBody>
+                    <a:bodyPr/>
+                    <a:lstStyle/>
+                    <a:p>
+                      <a:pPr algn="ctr">
+                        <a:lnSpc>
+                          <a:spcPct val="107000"/>
+                        </a:lnSpc>
+                        <a:spcAft>
+                          <a:spcPts val="0"/>
+                        </a:spcAft>
+                      </a:pPr>
+                      <a:r>
+                        <a:rPr lang="en-CA" sz="1800" dirty="0">
+                          <a:solidFill>
+                            <a:schemeClr val="tx1"/>
+                          </a:solidFill>
+                          <a:effectLst/>
+                        </a:rPr>
+                        <a:t>125</a:t>
+                      </a:r>
+                      <a:endParaRPr lang="en-CA" sz="1600" dirty="0">
+                        <a:solidFill>
+                          <a:schemeClr val="tx1"/>
+                        </a:solidFill>
+                        <a:effectLst/>
+                        <a:latin typeface="Calibri" panose="020F0502020204030204" pitchFamily="34" charset="0"/>
+                        <a:ea typeface="Calibri" panose="020F0502020204030204" pitchFamily="34" charset="0"/>
+                        <a:cs typeface="Times New Roman" panose="02020603050405020304" pitchFamily="18" charset="0"/>
+                      </a:endParaRPr>
+                    </a:p>
+                  </a:txBody>
+                  <a:tcPr marL="68580" marR="68580" marT="0" marB="0">
+                    <a:solidFill>
+                      <a:srgbClr val="FFC000"/>
+                    </a:solidFill>
+                  </a:tcPr>
+                </a:tc>
+                <a:extLst>
+                  <a:ext uri="{0D108BD9-81ED-4DB2-BD59-A6C34878D82A}">
+                    <a16:rowId xmlns:a16="http://schemas.microsoft.com/office/drawing/2014/main" val="2181804090"/>
+                  </a:ext>
+                </a:extLst>
+              </a:tr>
+              <a:tr h="237363">
+                <a:tc>
+                  <a:txBody>
+                    <a:bodyPr/>
+                    <a:lstStyle/>
+                    <a:p>
+                      <a:pPr algn="ctr">
+                        <a:lnSpc>
+                          <a:spcPct val="107000"/>
+                        </a:lnSpc>
+                        <a:spcAft>
+                          <a:spcPts val="0"/>
+                        </a:spcAft>
+                      </a:pPr>
+                      <a:r>
+                        <a:rPr lang="en-CA" sz="1800">
+                          <a:solidFill>
+                            <a:schemeClr val="tx1"/>
+                          </a:solidFill>
+                          <a:effectLst/>
+                        </a:rPr>
+                        <a:t>Average</a:t>
+                      </a:r>
+                      <a:endParaRPr lang="en-CA" sz="1600">
+                        <a:solidFill>
+                          <a:schemeClr val="tx1"/>
+                        </a:solidFill>
+                        <a:effectLst/>
+                        <a:latin typeface="Calibri" panose="020F0502020204030204" pitchFamily="34" charset="0"/>
+                        <a:ea typeface="Calibri" panose="020F0502020204030204" pitchFamily="34" charset="0"/>
+                        <a:cs typeface="Times New Roman" panose="02020603050405020304" pitchFamily="18" charset="0"/>
+                      </a:endParaRPr>
+                    </a:p>
+                  </a:txBody>
+                  <a:tcPr marL="68580" marR="68580" marT="0" marB="0">
+                    <a:solidFill>
+                      <a:srgbClr val="FFC000"/>
+                    </a:solidFill>
+                  </a:tcPr>
+                </a:tc>
+                <a:tc>
+                  <a:txBody>
+                    <a:bodyPr/>
+                    <a:lstStyle/>
+                    <a:p>
+                      <a:pPr algn="ctr">
+                        <a:lnSpc>
+                          <a:spcPct val="107000"/>
+                        </a:lnSpc>
+                        <a:spcAft>
+                          <a:spcPts val="0"/>
+                        </a:spcAft>
+                      </a:pPr>
+                      <a:r>
+                        <a:rPr lang="en-CA" sz="1800">
+                          <a:solidFill>
+                            <a:schemeClr val="tx1"/>
+                          </a:solidFill>
+                          <a:effectLst/>
+                        </a:rPr>
+                        <a:t>0.76</a:t>
+                      </a:r>
+                      <a:endParaRPr lang="en-CA" sz="1600">
+                        <a:solidFill>
+                          <a:schemeClr val="tx1"/>
+                        </a:solidFill>
+                        <a:effectLst/>
+                        <a:latin typeface="Calibri" panose="020F0502020204030204" pitchFamily="34" charset="0"/>
+                        <a:ea typeface="Calibri" panose="020F0502020204030204" pitchFamily="34" charset="0"/>
+                        <a:cs typeface="Times New Roman" panose="02020603050405020304" pitchFamily="18" charset="0"/>
+                      </a:endParaRPr>
+                    </a:p>
+                  </a:txBody>
+                  <a:tcPr marL="68580" marR="68580" marT="0" marB="0">
+                    <a:solidFill>
+                      <a:srgbClr val="FFC000"/>
+                    </a:solidFill>
+                  </a:tcPr>
+                </a:tc>
+                <a:tc>
+                  <a:txBody>
+                    <a:bodyPr/>
+                    <a:lstStyle/>
+                    <a:p>
+                      <a:pPr algn="ctr">
+                        <a:lnSpc>
+                          <a:spcPct val="107000"/>
+                        </a:lnSpc>
+                        <a:spcAft>
+                          <a:spcPts val="0"/>
+                        </a:spcAft>
+                      </a:pPr>
+                      <a:r>
+                        <a:rPr lang="en-CA" sz="1800">
+                          <a:solidFill>
+                            <a:schemeClr val="tx1"/>
+                          </a:solidFill>
+                          <a:effectLst/>
+                        </a:rPr>
+                        <a:t>0.75</a:t>
+                      </a:r>
+                      <a:endParaRPr lang="en-CA" sz="1600">
+                        <a:solidFill>
+                          <a:schemeClr val="tx1"/>
+                        </a:solidFill>
+                        <a:effectLst/>
+                        <a:latin typeface="Calibri" panose="020F0502020204030204" pitchFamily="34" charset="0"/>
+                        <a:ea typeface="Calibri" panose="020F0502020204030204" pitchFamily="34" charset="0"/>
+                        <a:cs typeface="Times New Roman" panose="02020603050405020304" pitchFamily="18" charset="0"/>
+                      </a:endParaRPr>
+                    </a:p>
+                  </a:txBody>
+                  <a:tcPr marL="68580" marR="68580" marT="0" marB="0">
+                    <a:solidFill>
+                      <a:srgbClr val="FFC000"/>
+                    </a:solidFill>
+                  </a:tcPr>
+                </a:tc>
+                <a:tc>
+                  <a:txBody>
+                    <a:bodyPr/>
+                    <a:lstStyle/>
+                    <a:p>
+                      <a:pPr algn="ctr">
+                        <a:lnSpc>
+                          <a:spcPct val="107000"/>
+                        </a:lnSpc>
+                        <a:spcAft>
+                          <a:spcPts val="0"/>
+                        </a:spcAft>
+                      </a:pPr>
+                      <a:r>
+                        <a:rPr lang="en-CA" sz="1800" dirty="0">
+                          <a:solidFill>
+                            <a:schemeClr val="tx1"/>
+                          </a:solidFill>
+                          <a:effectLst/>
+                        </a:rPr>
+                        <a:t>222</a:t>
+                      </a:r>
+                      <a:endParaRPr lang="en-CA" sz="1600" dirty="0">
+                        <a:solidFill>
+                          <a:schemeClr val="tx1"/>
+                        </a:solidFill>
+                        <a:effectLst/>
+                        <a:latin typeface="Calibri" panose="020F0502020204030204" pitchFamily="34" charset="0"/>
+                        <a:ea typeface="Calibri" panose="020F0502020204030204" pitchFamily="34" charset="0"/>
+                        <a:cs typeface="Times New Roman" panose="02020603050405020304" pitchFamily="18" charset="0"/>
+                      </a:endParaRPr>
+                    </a:p>
+                  </a:txBody>
+                  <a:tcPr marL="68580" marR="68580" marT="0" marB="0">
+                    <a:solidFill>
+                      <a:srgbClr val="FFC000"/>
+                    </a:solidFill>
+                  </a:tcPr>
+                </a:tc>
+                <a:extLst>
+                  <a:ext uri="{0D108BD9-81ED-4DB2-BD59-A6C34878D82A}">
+                    <a16:rowId xmlns:a16="http://schemas.microsoft.com/office/drawing/2014/main" val="3883364922"/>
                   </a:ext>
                 </a:extLst>
               </a:tr>
@@ -9863,10 +10284,10 @@
       </p:graphicFrame>
       <p:sp>
         <p:nvSpPr>
-          <p:cNvPr id="9" name="TextBox 8">
+          <p:cNvPr id="10" name="TextBox 9">
             <a:extLst>
               <a:ext uri="{FF2B5EF4-FFF2-40B4-BE49-F238E27FC236}">
-                <a16:creationId xmlns:a16="http://schemas.microsoft.com/office/drawing/2014/main" id="{F3C11004-CA99-41D4-8BE2-1D3B4FF272E6}"/>
+                <a16:creationId xmlns:a16="http://schemas.microsoft.com/office/drawing/2014/main" id="{4DB864C3-C6AE-417B-BB3A-3B13E964BC75}"/>
               </a:ext>
             </a:extLst>
           </p:cNvPr>
@@ -9875,7 +10296,7 @@
         </p:nvSpPr>
         <p:spPr>
           <a:xfrm>
-            <a:off x="503583" y="3592460"/>
+            <a:off x="6202903" y="4014988"/>
             <a:ext cx="4833592" cy="646331"/>
           </a:xfrm>
           <a:prstGeom prst="rect">
@@ -9895,66 +10316,7 @@
             </a:pPr>
             <a:r>
               <a:rPr lang="en-CA" dirty="0"/>
-              <a:t>Our model performed well on the training set but lacked quality in predicting the test set </a:t>
-            </a:r>
-          </a:p>
-        </p:txBody>
-      </p:sp>
-      <p:sp>
-        <p:nvSpPr>
-          <p:cNvPr id="11" name="TextBox 10">
-            <a:extLst>
-              <a:ext uri="{FF2B5EF4-FFF2-40B4-BE49-F238E27FC236}">
-                <a16:creationId xmlns:a16="http://schemas.microsoft.com/office/drawing/2014/main" id="{4E128E15-2AAD-40B8-94C6-D4B243ABF3CE}"/>
-              </a:ext>
-            </a:extLst>
-          </p:cNvPr>
-          <p:cNvSpPr txBox="1"/>
-          <p:nvPr/>
-        </p:nvSpPr>
-        <p:spPr>
-          <a:xfrm>
-            <a:off x="6095998" y="3592459"/>
-            <a:ext cx="5592417" cy="923330"/>
-          </a:xfrm>
-          <a:prstGeom prst="rect">
-            <a:avLst/>
-          </a:prstGeom>
-          <a:noFill/>
-        </p:spPr>
-        <p:txBody>
-          <a:bodyPr wrap="square" rtlCol="0">
-            <a:spAutoFit/>
-          </a:bodyPr>
-          <a:lstStyle/>
-          <a:p>
-            <a:pPr marL="285750" indent="-285750">
-              <a:buFont typeface="Arial" panose="020B0604020202020204" pitchFamily="34" charset="0"/>
-              <a:buChar char="•"/>
-            </a:pPr>
-            <a:r>
-              <a:rPr lang="en-CA" dirty="0"/>
-              <a:t>The MSE was low on both training and test set</a:t>
-            </a:r>
-          </a:p>
-          <a:p>
-            <a:pPr marL="285750" indent="-285750">
-              <a:buFont typeface="Arial" panose="020B0604020202020204" pitchFamily="34" charset="0"/>
-              <a:buChar char="•"/>
-            </a:pPr>
-            <a:r>
-              <a:rPr lang="en-CA" dirty="0"/>
-              <a:t>MSE decreases on the test set </a:t>
-            </a:r>
-          </a:p>
-          <a:p>
-            <a:pPr marL="285750" indent="-285750">
-              <a:buFont typeface="Arial" panose="020B0604020202020204" pitchFamily="34" charset="0"/>
-              <a:buChar char="•"/>
-            </a:pPr>
-            <a:r>
-              <a:rPr lang="en-CA" dirty="0"/>
-              <a:t>Our predictions are more stable</a:t>
+              <a:t>A classification report shows an average precision and recall rate. </a:t>
             </a:r>
           </a:p>
         </p:txBody>
@@ -11984,7 +12346,7 @@
         <p:spPr>
           <a:xfrm>
             <a:off x="208768" y="3457320"/>
-            <a:ext cx="11637489" cy="923330"/>
+            <a:ext cx="11637489" cy="646331"/>
           </a:xfrm>
           <a:prstGeom prst="rect">
             <a:avLst/>
@@ -12013,17 +12375,7 @@
             </a:pPr>
             <a:r>
               <a:rPr lang="en-CA" dirty="0"/>
-              <a:t>Did not delete rows with NaN values initially for exploratory analysis</a:t>
-            </a:r>
-          </a:p>
-          <a:p>
-            <a:pPr marL="285750" indent="-285750">
-              <a:buFont typeface="Arial" panose="020B0604020202020204" pitchFamily="34" charset="0"/>
-              <a:buChar char="•"/>
-            </a:pPr>
-            <a:r>
-              <a:rPr lang="en-CA" dirty="0"/>
-              <a:t>Will need to delete rows for supervised learning analysis</a:t>
+              <a:t>Exploratory analysis v Supervised Learning</a:t>
             </a:r>
           </a:p>
         </p:txBody>
@@ -12077,8 +12429,8 @@
         </p:nvSpPr>
         <p:spPr>
           <a:xfrm>
-            <a:off x="208768" y="5185234"/>
-            <a:ext cx="11637489" cy="923330"/>
+            <a:off x="208767" y="5079216"/>
+            <a:ext cx="11637489" cy="646331"/>
           </a:xfrm>
           <a:prstGeom prst="rect">
             <a:avLst/>
@@ -12098,16 +12450,6 @@
             <a:r>
               <a:rPr lang="en-CA" dirty="0"/>
               <a:t>Variables that had 50% or more of the data missing were dropped</a:t>
-            </a:r>
-          </a:p>
-          <a:p>
-            <a:pPr marL="285750" indent="-285750">
-              <a:buFont typeface="Arial" panose="020B0604020202020204" pitchFamily="34" charset="0"/>
-              <a:buChar char="•"/>
-            </a:pPr>
-            <a:r>
-              <a:rPr lang="en-CA" dirty="0"/>
-              <a:t>These variables do not add value to analysis </a:t>
             </a:r>
           </a:p>
           <a:p>

</xml_diff>